<commit_message>
chore: updated flow diagram
</commit_message>
<xml_diff>
--- a/flow.pptx
+++ b/flow.pptx
@@ -104,6 +104,11 @@
       </a:defRPr>
     </a:lvl9pPr>
   </p:defaultTextStyle>
+  <p:extLst>
+    <p:ext uri="{EFAFB233-063F-42B5-8137-9DF3F51BA10A}">
+      <p15:sldGuideLst xmlns:p15="http://schemas.microsoft.com/office/powerpoint/2012/main"/>
+    </p:ext>
+  </p:extLst>
 </p:presentation>
 </file>
 
@@ -3344,6 +3349,110 @@
       </p:grpSpPr>
       <p:sp>
         <p:nvSpPr>
+          <p:cNvPr id="18" name="Rectangle 17">
+            <a:extLst>
+              <a:ext uri="{FF2B5EF4-FFF2-40B4-BE49-F238E27FC236}">
+                <a16:creationId xmlns:a16="http://schemas.microsoft.com/office/drawing/2014/main" id="{46DF9918-2504-450E-B985-9F44A5F918B2}"/>
+              </a:ext>
+            </a:extLst>
+          </p:cNvPr>
+          <p:cNvSpPr/>
+          <p:nvPr/>
+        </p:nvSpPr>
+        <p:spPr>
+          <a:xfrm>
+            <a:off x="8719757" y="637560"/>
+            <a:ext cx="2521492" cy="5453903"/>
+          </a:xfrm>
+          <a:prstGeom prst="rect">
+            <a:avLst/>
+          </a:prstGeom>
+          <a:solidFill>
+            <a:schemeClr val="bg1"/>
+          </a:solidFill>
+          <a:ln>
+            <a:prstDash val="dash"/>
+          </a:ln>
+        </p:spPr>
+        <p:style>
+          <a:lnRef idx="2">
+            <a:schemeClr val="accent1">
+              <a:shade val="50000"/>
+            </a:schemeClr>
+          </a:lnRef>
+          <a:fillRef idx="1">
+            <a:schemeClr val="accent1"/>
+          </a:fillRef>
+          <a:effectRef idx="0">
+            <a:schemeClr val="accent1"/>
+          </a:effectRef>
+          <a:fontRef idx="minor">
+            <a:schemeClr val="lt1"/>
+          </a:fontRef>
+        </p:style>
+        <p:txBody>
+          <a:bodyPr rtlCol="0" anchor="ctr"/>
+          <a:lstStyle/>
+          <a:p>
+            <a:pPr algn="ctr"/>
+            <a:endParaRPr lang="en-PH" sz="1600"/>
+          </a:p>
+        </p:txBody>
+      </p:sp>
+      <p:sp>
+        <p:nvSpPr>
+          <p:cNvPr id="16" name="Rectangle 15">
+            <a:extLst>
+              <a:ext uri="{FF2B5EF4-FFF2-40B4-BE49-F238E27FC236}">
+                <a16:creationId xmlns:a16="http://schemas.microsoft.com/office/drawing/2014/main" id="{DE07AE1D-382E-424C-8C6D-271A121DA4FB}"/>
+              </a:ext>
+            </a:extLst>
+          </p:cNvPr>
+          <p:cNvSpPr/>
+          <p:nvPr/>
+        </p:nvSpPr>
+        <p:spPr>
+          <a:xfrm>
+            <a:off x="6077224" y="637561"/>
+            <a:ext cx="2521492" cy="5453903"/>
+          </a:xfrm>
+          <a:prstGeom prst="rect">
+            <a:avLst/>
+          </a:prstGeom>
+          <a:solidFill>
+            <a:schemeClr val="bg1"/>
+          </a:solidFill>
+          <a:ln>
+            <a:prstDash val="dash"/>
+          </a:ln>
+        </p:spPr>
+        <p:style>
+          <a:lnRef idx="2">
+            <a:schemeClr val="accent1">
+              <a:shade val="50000"/>
+            </a:schemeClr>
+          </a:lnRef>
+          <a:fillRef idx="1">
+            <a:schemeClr val="accent1"/>
+          </a:fillRef>
+          <a:effectRef idx="0">
+            <a:schemeClr val="accent1"/>
+          </a:effectRef>
+          <a:fontRef idx="minor">
+            <a:schemeClr val="lt1"/>
+          </a:fontRef>
+        </p:style>
+        <p:txBody>
+          <a:bodyPr rtlCol="0" anchor="ctr"/>
+          <a:lstStyle/>
+          <a:p>
+            <a:pPr algn="ctr"/>
+            <a:endParaRPr lang="en-PH" sz="1600"/>
+          </a:p>
+        </p:txBody>
+      </p:sp>
+      <p:sp>
+        <p:nvSpPr>
           <p:cNvPr id="13" name="Rectangle 12">
             <a:extLst>
               <a:ext uri="{FF2B5EF4-FFF2-40B4-BE49-F238E27FC236}">
@@ -3357,7 +3466,7 @@
         <p:spPr>
           <a:xfrm>
             <a:off x="3523317" y="637562"/>
-            <a:ext cx="2449644" cy="5453903"/>
+            <a:ext cx="2432866" cy="5453903"/>
           </a:xfrm>
           <a:prstGeom prst="rect">
             <a:avLst/>
@@ -3575,7 +3684,7 @@
         </p:nvSpPr>
         <p:spPr>
           <a:xfrm>
-            <a:off x="6096000" y="766534"/>
+            <a:off x="6170502" y="766534"/>
             <a:ext cx="2334936" cy="760262"/>
           </a:xfrm>
           <a:prstGeom prst="rect">
@@ -3610,18 +3719,7 @@
             <a:pPr algn="ctr"/>
             <a:r>
               <a:rPr lang="en-PH" dirty="0"/>
-              <a:t>Create new release for the </a:t>
-            </a:r>
-          </a:p>
-          <a:p>
-            <a:pPr algn="ctr"/>
-            <a:r>
-              <a:rPr lang="en-PH" dirty="0" err="1"/>
-              <a:t>npm</a:t>
-            </a:r>
-            <a:r>
-              <a:rPr lang="en-PH" dirty="0"/>
-              <a:t> package </a:t>
+              <a:t>Create a new release</a:t>
             </a:r>
           </a:p>
         </p:txBody>
@@ -3640,8 +3738,8 @@
         </p:nvSpPr>
         <p:spPr>
           <a:xfrm>
-            <a:off x="8829415" y="766534"/>
-            <a:ext cx="2044116" cy="760262"/>
+            <a:off x="8879748" y="766534"/>
+            <a:ext cx="2093051" cy="760262"/>
           </a:xfrm>
           <a:prstGeom prst="rect">
             <a:avLst/>
@@ -3842,6 +3940,236 @@
             <a:r>
               <a:rPr lang="en-PH" sz="1400" dirty="0"/>
               <a:t>)</a:t>
+            </a:r>
+          </a:p>
+        </p:txBody>
+      </p:sp>
+      <p:sp>
+        <p:nvSpPr>
+          <p:cNvPr id="15" name="TextBox 14">
+            <a:extLst>
+              <a:ext uri="{FF2B5EF4-FFF2-40B4-BE49-F238E27FC236}">
+                <a16:creationId xmlns:a16="http://schemas.microsoft.com/office/drawing/2014/main" id="{27EC2F20-C005-4818-B51C-E204C2E2A4B3}"/>
+              </a:ext>
+            </a:extLst>
+          </p:cNvPr>
+          <p:cNvSpPr txBox="1"/>
+          <p:nvPr/>
+        </p:nvSpPr>
+        <p:spPr>
+          <a:xfrm>
+            <a:off x="3692094" y="3062663"/>
+            <a:ext cx="2112089" cy="954107"/>
+          </a:xfrm>
+          <a:prstGeom prst="rect">
+            <a:avLst/>
+          </a:prstGeom>
+          <a:noFill/>
+        </p:spPr>
+        <p:txBody>
+          <a:bodyPr wrap="square" rtlCol="0">
+            <a:spAutoFit/>
+          </a:bodyPr>
+          <a:lstStyle/>
+          <a:p>
+            <a:r>
+              <a:rPr lang="en-PH" sz="1400" dirty="0"/>
+              <a:t>Pre-push hook has been setup to ensure that library has no build error before pushing.</a:t>
+            </a:r>
+          </a:p>
+        </p:txBody>
+      </p:sp>
+      <p:sp>
+        <p:nvSpPr>
+          <p:cNvPr id="17" name="TextBox 16">
+            <a:extLst>
+              <a:ext uri="{FF2B5EF4-FFF2-40B4-BE49-F238E27FC236}">
+                <a16:creationId xmlns:a16="http://schemas.microsoft.com/office/drawing/2014/main" id="{D8BCF798-B890-4707-AA53-B4BE978C841D}"/>
+              </a:ext>
+            </a:extLst>
+          </p:cNvPr>
+          <p:cNvSpPr txBox="1"/>
+          <p:nvPr/>
+        </p:nvSpPr>
+        <p:spPr>
+          <a:xfrm>
+            <a:off x="6281925" y="1655768"/>
+            <a:ext cx="2112089" cy="3000821"/>
+          </a:xfrm>
+          <a:prstGeom prst="rect">
+            <a:avLst/>
+          </a:prstGeom>
+          <a:noFill/>
+        </p:spPr>
+        <p:txBody>
+          <a:bodyPr wrap="square" rtlCol="0">
+            <a:spAutoFit/>
+          </a:bodyPr>
+          <a:lstStyle/>
+          <a:p>
+            <a:r>
+              <a:rPr lang="en-PH" sz="1400" dirty="0"/>
+              <a:t>Creating a new release is done by running</a:t>
+            </a:r>
+          </a:p>
+          <a:p>
+            <a:endParaRPr lang="en-PH" sz="1400" dirty="0"/>
+          </a:p>
+          <a:p>
+            <a:r>
+              <a:rPr lang="en-PH" sz="1400" dirty="0" err="1"/>
+              <a:t>npm</a:t>
+            </a:r>
+            <a:r>
+              <a:rPr lang="en-PH" sz="1400" dirty="0"/>
+              <a:t> run release</a:t>
+            </a:r>
+          </a:p>
+          <a:p>
+            <a:endParaRPr lang="en-PH" sz="1400" dirty="0"/>
+          </a:p>
+          <a:p>
+            <a:r>
+              <a:rPr lang="en-PH" sz="1400" dirty="0"/>
+              <a:t>And pushing the changes to master. This script will:</a:t>
+            </a:r>
+          </a:p>
+          <a:p>
+            <a:endParaRPr lang="en-PH" sz="1400" dirty="0"/>
+          </a:p>
+          <a:p>
+            <a:pPr marL="285750" indent="-285750">
+              <a:buFont typeface="Arial" panose="020B0604020202020204" pitchFamily="34" charset="0"/>
+              <a:buChar char="•"/>
+            </a:pPr>
+            <a:r>
+              <a:rPr lang="en-US" sz="1100" dirty="0"/>
+              <a:t>bump the version of the library, </a:t>
+            </a:r>
+          </a:p>
+          <a:p>
+            <a:pPr marL="285750" indent="-285750">
+              <a:buFont typeface="Arial" panose="020B0604020202020204" pitchFamily="34" charset="0"/>
+              <a:buChar char="•"/>
+            </a:pPr>
+            <a:r>
+              <a:rPr lang="en-US" sz="1100" dirty="0"/>
+              <a:t>generates a changelog based on the commits, </a:t>
+            </a:r>
+          </a:p>
+          <a:p>
+            <a:pPr marL="285750" indent="-285750">
+              <a:buFont typeface="Arial" panose="020B0604020202020204" pitchFamily="34" charset="0"/>
+              <a:buChar char="•"/>
+            </a:pPr>
+            <a:r>
+              <a:rPr lang="en-US" sz="1100" dirty="0"/>
+              <a:t>creates a new commit </a:t>
+            </a:r>
+          </a:p>
+          <a:p>
+            <a:pPr marL="285750" indent="-285750">
+              <a:buFont typeface="Arial" panose="020B0604020202020204" pitchFamily="34" charset="0"/>
+              <a:buChar char="•"/>
+            </a:pPr>
+            <a:r>
+              <a:rPr lang="en-US" sz="1100" dirty="0"/>
+              <a:t>and a new tag version along with it.</a:t>
+            </a:r>
+            <a:endParaRPr lang="en-PH" sz="1100" dirty="0"/>
+          </a:p>
+        </p:txBody>
+      </p:sp>
+      <p:sp>
+        <p:nvSpPr>
+          <p:cNvPr id="19" name="TextBox 18">
+            <a:extLst>
+              <a:ext uri="{FF2B5EF4-FFF2-40B4-BE49-F238E27FC236}">
+                <a16:creationId xmlns:a16="http://schemas.microsoft.com/office/drawing/2014/main" id="{703170AA-3F9E-4B01-A708-414256A13748}"/>
+              </a:ext>
+            </a:extLst>
+          </p:cNvPr>
+          <p:cNvSpPr txBox="1"/>
+          <p:nvPr/>
+        </p:nvSpPr>
+        <p:spPr>
+          <a:xfrm>
+            <a:off x="8879748" y="1655768"/>
+            <a:ext cx="2112089" cy="1677382"/>
+          </a:xfrm>
+          <a:prstGeom prst="rect">
+            <a:avLst/>
+          </a:prstGeom>
+          <a:noFill/>
+        </p:spPr>
+        <p:txBody>
+          <a:bodyPr wrap="square" rtlCol="0">
+            <a:spAutoFit/>
+          </a:bodyPr>
+          <a:lstStyle/>
+          <a:p>
+            <a:r>
+              <a:rPr lang="en-PH" sz="1400" dirty="0"/>
+              <a:t>Pushing commits with tags for a new release should trigger a new build in azure dev ops</a:t>
+            </a:r>
+          </a:p>
+          <a:p>
+            <a:endParaRPr lang="en-PH" sz="1400" dirty="0"/>
+          </a:p>
+          <a:p>
+            <a:r>
+              <a:rPr lang="en-PH" sz="1100" dirty="0"/>
+              <a:t>This build pipeline will publish a new version in azure dev ops Artifacts feed.</a:t>
+            </a:r>
+          </a:p>
+        </p:txBody>
+      </p:sp>
+      <p:sp>
+        <p:nvSpPr>
+          <p:cNvPr id="20" name="TextBox 19">
+            <a:extLst>
+              <a:ext uri="{FF2B5EF4-FFF2-40B4-BE49-F238E27FC236}">
+                <a16:creationId xmlns:a16="http://schemas.microsoft.com/office/drawing/2014/main" id="{24D2DBCE-9895-4435-8436-6B0F062E3B8A}"/>
+              </a:ext>
+            </a:extLst>
+          </p:cNvPr>
+          <p:cNvSpPr txBox="1"/>
+          <p:nvPr/>
+        </p:nvSpPr>
+        <p:spPr>
+          <a:xfrm>
+            <a:off x="6281924" y="4785561"/>
+            <a:ext cx="2112089" cy="1077218"/>
+          </a:xfrm>
+          <a:prstGeom prst="rect">
+            <a:avLst/>
+          </a:prstGeom>
+          <a:noFill/>
+        </p:spPr>
+        <p:txBody>
+          <a:bodyPr wrap="square" rtlCol="0">
+            <a:spAutoFit/>
+          </a:bodyPr>
+          <a:lstStyle/>
+          <a:p>
+            <a:r>
+              <a:rPr lang="en-PH" sz="1400" dirty="0"/>
+              <a:t>In VS Code, Push changes with tags by:</a:t>
+            </a:r>
+          </a:p>
+          <a:p>
+            <a:endParaRPr lang="en-PH" sz="1400" dirty="0"/>
+          </a:p>
+          <a:p>
+            <a:r>
+              <a:rPr lang="en-PH" sz="1100" dirty="0"/>
+              <a:t>Pressing Ctrl + Shift + P</a:t>
+            </a:r>
+          </a:p>
+          <a:p>
+            <a:r>
+              <a:rPr lang="en-PH" sz="1100" dirty="0"/>
+              <a:t>Type Git: Push (Follow tags)</a:t>
             </a:r>
           </a:p>
         </p:txBody>

</xml_diff>

<commit_message>
chore: update flow again
</commit_message>
<xml_diff>
--- a/flow.pptx
+++ b/flow.pptx
@@ -3691,7 +3691,7 @@
             <a:avLst/>
           </a:prstGeom>
           <a:solidFill>
-            <a:schemeClr val="accent4">
+            <a:schemeClr val="accent5">
               <a:lumMod val="75000"/>
             </a:schemeClr>
           </a:solidFill>
@@ -3745,7 +3745,7 @@
             <a:avLst/>
           </a:prstGeom>
           <a:solidFill>
-            <a:schemeClr val="accent4">
+            <a:schemeClr val="accent6">
               <a:lumMod val="75000"/>
             </a:schemeClr>
           </a:solidFill>
@@ -3828,7 +3828,7 @@
         <p:spPr>
           <a:xfrm>
             <a:off x="638701" y="2625849"/>
-            <a:ext cx="2642533" cy="523220"/>
+            <a:ext cx="2642533" cy="461665"/>
           </a:xfrm>
           <a:prstGeom prst="rect">
             <a:avLst/>
@@ -3842,15 +3842,23 @@
           <a:lstStyle/>
           <a:p>
             <a:r>
-              <a:rPr lang="en-PH" sz="1400" dirty="0"/>
+              <a:rPr lang="en-PH" sz="1200" dirty="0"/>
               <a:t>ng generate component –project &lt;</a:t>
             </a:r>
             <a:r>
-              <a:rPr lang="en-PH" sz="1400" dirty="0" err="1"/>
+              <a:rPr lang="en-PH" sz="1200" dirty="0" err="1"/>
               <a:t>library_name</a:t>
             </a:r>
             <a:r>
-              <a:rPr lang="en-PH" sz="1400" dirty="0"/>
+              <a:rPr lang="en-PH" sz="1200" dirty="0"/>
+              <a:t>&gt; &lt;</a:t>
+            </a:r>
+            <a:r>
+              <a:rPr lang="en-PH" sz="1200" dirty="0" err="1"/>
+              <a:t>component_name</a:t>
+            </a:r>
+            <a:r>
+              <a:rPr lang="en-PH" sz="1200" dirty="0"/>
               <a:t>&gt;</a:t>
             </a:r>
           </a:p>
@@ -3871,7 +3879,7 @@
         <p:spPr>
           <a:xfrm>
             <a:off x="615991" y="3185712"/>
-            <a:ext cx="2642533" cy="523220"/>
+            <a:ext cx="2642533" cy="461665"/>
           </a:xfrm>
           <a:prstGeom prst="rect">
             <a:avLst/>
@@ -3885,15 +3893,23 @@
           <a:lstStyle/>
           <a:p>
             <a:r>
-              <a:rPr lang="en-PH" sz="1400" dirty="0"/>
+              <a:rPr lang="en-PH" sz="1200" dirty="0"/>
               <a:t>ng generate service –project &lt;</a:t>
             </a:r>
             <a:r>
-              <a:rPr lang="en-PH" sz="1400" dirty="0" err="1"/>
+              <a:rPr lang="en-PH" sz="1200" dirty="0" err="1"/>
               <a:t>library_name</a:t>
             </a:r>
             <a:r>
-              <a:rPr lang="en-PH" sz="1400" dirty="0"/>
+              <a:rPr lang="en-PH" sz="1200" dirty="0"/>
+              <a:t>&gt; &lt;</a:t>
+            </a:r>
+            <a:r>
+              <a:rPr lang="en-PH" sz="1200" dirty="0" err="1"/>
+              <a:t>service_name</a:t>
+            </a:r>
+            <a:r>
+              <a:rPr lang="en-PH" sz="1200" dirty="0"/>
               <a:t>&gt;</a:t>
             </a:r>
           </a:p>
@@ -3914,7 +3930,7 @@
         <p:spPr>
           <a:xfrm>
             <a:off x="3693093" y="1660303"/>
-            <a:ext cx="2112089" cy="1169551"/>
+            <a:ext cx="2112089" cy="2677656"/>
           </a:xfrm>
           <a:prstGeom prst="rect">
             <a:avLst/>
@@ -3939,7 +3955,7 @@
             </a:r>
             <a:r>
               <a:rPr lang="en-PH" sz="1400" dirty="0"/>
-              <a:t>)</a:t>
+              <a:t>). This will be used to determine the changes to be included on the changelogs and the release version which follows semantic versioning.</a:t>
             </a:r>
           </a:p>
         </p:txBody>
@@ -3958,7 +3974,7 @@
         </p:nvSpPr>
         <p:spPr>
           <a:xfrm>
-            <a:off x="3692094" y="3062663"/>
+            <a:off x="3639393" y="4414493"/>
             <a:ext cx="2112089" cy="954107"/>
           </a:xfrm>
           <a:prstGeom prst="rect">
@@ -3974,7 +3990,7 @@
           <a:p>
             <a:r>
               <a:rPr lang="en-PH" sz="1400" dirty="0"/>
-              <a:t>Pre-push hook has been setup to ensure that library has no build error before pushing.</a:t>
+              <a:t>Pre-push hook has also been setup to ensure that library has no build error before pushing.</a:t>
             </a:r>
           </a:p>
         </p:txBody>
@@ -3994,7 +4010,7 @@
         <p:spPr>
           <a:xfrm>
             <a:off x="6281925" y="1655768"/>
-            <a:ext cx="2112089" cy="3000821"/>
+            <a:ext cx="2112089" cy="2893100"/>
           </a:xfrm>
           <a:prstGeom prst="rect">
             <a:avLst/>
@@ -4008,34 +4024,31 @@
           <a:lstStyle/>
           <a:p>
             <a:r>
-              <a:rPr lang="en-PH" sz="1400" dirty="0"/>
+              <a:rPr lang="en-PH" sz="1200" dirty="0"/>
               <a:t>Creating a new release is done by running</a:t>
             </a:r>
           </a:p>
           <a:p>
-            <a:endParaRPr lang="en-PH" sz="1400" dirty="0"/>
-          </a:p>
-          <a:p>
-            <a:r>
-              <a:rPr lang="en-PH" sz="1400" dirty="0" err="1"/>
+            <a:endParaRPr lang="en-PH" sz="1200" dirty="0"/>
+          </a:p>
+          <a:p>
+            <a:r>
+              <a:rPr lang="en-PH" sz="1200" dirty="0" err="1"/>
               <a:t>npm</a:t>
             </a:r>
             <a:r>
-              <a:rPr lang="en-PH" sz="1400" dirty="0"/>
+              <a:rPr lang="en-PH" sz="1200" dirty="0"/>
               <a:t> run release</a:t>
             </a:r>
           </a:p>
           <a:p>
-            <a:endParaRPr lang="en-PH" sz="1400" dirty="0"/>
-          </a:p>
-          <a:p>
-            <a:r>
-              <a:rPr lang="en-PH" sz="1400" dirty="0"/>
-              <a:t>And pushing the changes to master. This script will:</a:t>
-            </a:r>
-          </a:p>
-          <a:p>
-            <a:endParaRPr lang="en-PH" sz="1400" dirty="0"/>
+            <a:endParaRPr lang="en-PH" sz="1200" dirty="0"/>
+          </a:p>
+          <a:p>
+            <a:r>
+              <a:rPr lang="en-PH" sz="1200" dirty="0"/>
+              <a:t>This script will:</a:t>
+            </a:r>
           </a:p>
           <a:p>
             <a:pPr marL="285750" indent="-285750">
@@ -4076,7 +4089,19 @@
               <a:rPr lang="en-US" sz="1100" dirty="0"/>
               <a:t>and a new tag version along with it.</a:t>
             </a:r>
-            <a:endParaRPr lang="en-PH" sz="1100" dirty="0"/>
+          </a:p>
+          <a:p>
+            <a:pPr marL="285750" indent="-285750">
+              <a:buFont typeface="Arial" panose="020B0604020202020204" pitchFamily="34" charset="0"/>
+              <a:buChar char="•"/>
+            </a:pPr>
+            <a:endParaRPr lang="en-US" sz="1100" dirty="0"/>
+          </a:p>
+          <a:p>
+            <a:r>
+              <a:rPr lang="en-PH" sz="1100" dirty="0"/>
+              <a:t>After that dev should push changes to master.</a:t>
+            </a:r>
           </a:p>
         </p:txBody>
       </p:sp>
@@ -4138,7 +4163,7 @@
         </p:nvSpPr>
         <p:spPr>
           <a:xfrm>
-            <a:off x="6281924" y="4785561"/>
+            <a:off x="6281925" y="4663623"/>
             <a:ext cx="2112089" cy="1077218"/>
           </a:xfrm>
           <a:prstGeom prst="rect">
@@ -4170,6 +4195,57 @@
             <a:r>
               <a:rPr lang="en-PH" sz="1100" dirty="0"/>
               <a:t>Type Git: Push (Follow tags)</a:t>
+            </a:r>
+          </a:p>
+        </p:txBody>
+      </p:sp>
+      <p:sp>
+        <p:nvSpPr>
+          <p:cNvPr id="21" name="TextBox 20">
+            <a:extLst>
+              <a:ext uri="{FF2B5EF4-FFF2-40B4-BE49-F238E27FC236}">
+                <a16:creationId xmlns:a16="http://schemas.microsoft.com/office/drawing/2014/main" id="{7CD8AC02-2E84-4761-9F3A-2F7C26705CB2}"/>
+              </a:ext>
+            </a:extLst>
+          </p:cNvPr>
+          <p:cNvSpPr txBox="1"/>
+          <p:nvPr/>
+        </p:nvSpPr>
+        <p:spPr>
+          <a:xfrm>
+            <a:off x="627345" y="3791670"/>
+            <a:ext cx="2642533" cy="461665"/>
+          </a:xfrm>
+          <a:prstGeom prst="rect">
+            <a:avLst/>
+          </a:prstGeom>
+          <a:noFill/>
+        </p:spPr>
+        <p:txBody>
+          <a:bodyPr wrap="square" rtlCol="0">
+            <a:spAutoFit/>
+          </a:bodyPr>
+          <a:lstStyle/>
+          <a:p>
+            <a:r>
+              <a:rPr lang="en-PH" sz="1200" dirty="0"/>
+              <a:t>Use </a:t>
+            </a:r>
+            <a:r>
+              <a:rPr lang="en-PH" sz="1200" dirty="0" err="1"/>
+              <a:t>npm</a:t>
+            </a:r>
+            <a:r>
+              <a:rPr lang="en-PH" sz="1200" dirty="0"/>
+              <a:t> run </a:t>
+            </a:r>
+            <a:r>
+              <a:rPr lang="en-PH" sz="1200" dirty="0" err="1"/>
+              <a:t>build:dataload:watch</a:t>
+            </a:r>
+            <a:r>
+              <a:rPr lang="en-PH" sz="1200" dirty="0"/>
+              <a:t> to watch changes while developing.</a:t>
             </a:r>
           </a:p>
         </p:txBody>

</xml_diff>

<commit_message>
chore: added git code in the flow diagram
</commit_message>
<xml_diff>
--- a/flow.pptx
+++ b/flow.pptx
@@ -4010,7 +4010,7 @@
         <p:spPr>
           <a:xfrm>
             <a:off x="6281925" y="1655768"/>
-            <a:ext cx="2112089" cy="2893100"/>
+            <a:ext cx="2112089" cy="4416594"/>
           </a:xfrm>
           <a:prstGeom prst="rect">
             <a:avLst/>
@@ -4102,6 +4102,40 @@
               <a:rPr lang="en-PH" sz="1100" dirty="0"/>
               <a:t>After that dev should push changes to master.</a:t>
             </a:r>
+          </a:p>
+          <a:p>
+            <a:endParaRPr lang="en-PH" sz="1100" dirty="0"/>
+          </a:p>
+          <a:p>
+            <a:r>
+              <a:rPr lang="en-US" sz="1100" b="1" dirty="0"/>
+              <a:t>git push --follow-tags origin master</a:t>
+            </a:r>
+          </a:p>
+          <a:p>
+            <a:endParaRPr lang="en-US" sz="1100" dirty="0"/>
+          </a:p>
+          <a:p>
+            <a:r>
+              <a:rPr lang="en-PH" sz="1100" dirty="0"/>
+              <a:t>In VS Code, Push changes with tags by </a:t>
+            </a:r>
+            <a:r>
+              <a:rPr lang="en-PH" sz="1100" b="1" dirty="0"/>
+              <a:t>pressing Ctrl + Shift + P</a:t>
+            </a:r>
+          </a:p>
+          <a:p>
+            <a:r>
+              <a:rPr lang="en-PH" sz="1100" b="1" dirty="0"/>
+              <a:t>Type Git: Push (Follow tags)</a:t>
+            </a:r>
+          </a:p>
+          <a:p>
+            <a:endParaRPr lang="en-PH" sz="1100" dirty="0"/>
+          </a:p>
+          <a:p>
+            <a:endParaRPr lang="en-PH" sz="1100" dirty="0"/>
           </a:p>
         </p:txBody>
       </p:sp>
@@ -4151,56 +4185,6 @@
       </p:sp>
       <p:sp>
         <p:nvSpPr>
-          <p:cNvPr id="20" name="TextBox 19">
-            <a:extLst>
-              <a:ext uri="{FF2B5EF4-FFF2-40B4-BE49-F238E27FC236}">
-                <a16:creationId xmlns:a16="http://schemas.microsoft.com/office/drawing/2014/main" id="{24D2DBCE-9895-4435-8436-6B0F062E3B8A}"/>
-              </a:ext>
-            </a:extLst>
-          </p:cNvPr>
-          <p:cNvSpPr txBox="1"/>
-          <p:nvPr/>
-        </p:nvSpPr>
-        <p:spPr>
-          <a:xfrm>
-            <a:off x="6281925" y="4663623"/>
-            <a:ext cx="2112089" cy="1077218"/>
-          </a:xfrm>
-          <a:prstGeom prst="rect">
-            <a:avLst/>
-          </a:prstGeom>
-          <a:noFill/>
-        </p:spPr>
-        <p:txBody>
-          <a:bodyPr wrap="square" rtlCol="0">
-            <a:spAutoFit/>
-          </a:bodyPr>
-          <a:lstStyle/>
-          <a:p>
-            <a:r>
-              <a:rPr lang="en-PH" sz="1400" dirty="0"/>
-              <a:t>In VS Code, Push changes with tags by:</a:t>
-            </a:r>
-          </a:p>
-          <a:p>
-            <a:endParaRPr lang="en-PH" sz="1400" dirty="0"/>
-          </a:p>
-          <a:p>
-            <a:r>
-              <a:rPr lang="en-PH" sz="1100" dirty="0"/>
-              <a:t>Pressing Ctrl + Shift + P</a:t>
-            </a:r>
-          </a:p>
-          <a:p>
-            <a:r>
-              <a:rPr lang="en-PH" sz="1100" dirty="0"/>
-              <a:t>Type Git: Push (Follow tags)</a:t>
-            </a:r>
-          </a:p>
-        </p:txBody>
-      </p:sp>
-      <p:sp>
-        <p:nvSpPr>
           <p:cNvPr id="21" name="TextBox 20">
             <a:extLst>
               <a:ext uri="{FF2B5EF4-FFF2-40B4-BE49-F238E27FC236}">
@@ -4232,20 +4216,24 @@
               <a:t>Use </a:t>
             </a:r>
             <a:r>
-              <a:rPr lang="en-PH" sz="1200" dirty="0" err="1"/>
+              <a:rPr lang="en-PH" sz="1200" b="1" dirty="0" err="1"/>
               <a:t>npm</a:t>
             </a:r>
             <a:r>
+              <a:rPr lang="en-PH" sz="1200" b="1" dirty="0"/>
+              <a:t> run </a:t>
+            </a:r>
+            <a:r>
+              <a:rPr lang="en-PH" sz="1200" b="1" dirty="0" err="1"/>
+              <a:t>build:dataload:watch</a:t>
+            </a:r>
+            <a:r>
+              <a:rPr lang="en-PH" sz="1200" b="1" dirty="0"/>
+              <a:t> </a:t>
+            </a:r>
+            <a:r>
               <a:rPr lang="en-PH" sz="1200" dirty="0"/>
-              <a:t> run </a:t>
-            </a:r>
-            <a:r>
-              <a:rPr lang="en-PH" sz="1200" dirty="0" err="1"/>
-              <a:t>build:dataload:watch</a:t>
-            </a:r>
-            <a:r>
-              <a:rPr lang="en-PH" sz="1200" dirty="0"/>
-              <a:t> to watch changes while developing.</a:t>
+              <a:t>to watch changes while developing.</a:t>
             </a:r>
           </a:p>
         </p:txBody>

</xml_diff>